<commit_message>
추가 : UE4 pitch yaw roll
</commit_message>
<xml_diff>
--- a/assets/asset.pptx
+++ b/assets/asset.pptx
@@ -10,6 +10,7 @@
     <p:sldId id="258" r:id="rId4"/>
     <p:sldId id="259" r:id="rId5"/>
     <p:sldId id="260" r:id="rId6"/>
+    <p:sldId id="261" r:id="rId7"/>
   </p:sldIdLst>
   <p:sldSz cx="12192000" cy="6858000"/>
   <p:notesSz cx="6858000" cy="9144000"/>
@@ -265,7 +266,7 @@
           <a:p>
             <a:fld id="{62F62857-B228-3A40-90DD-E9A7B26EE83A}" type="datetimeFigureOut">
               <a:rPr kumimoji="1" lang="ko-Kore-KR" altLang="en-US" smtClean="0"/>
-              <a:t>2022. 3. 5.</a:t>
+              <a:t>03/21/2022</a:t>
             </a:fld>
             <a:endParaRPr kumimoji="1" lang="ko-Kore-KR" altLang="en-US"/>
           </a:p>
@@ -465,7 +466,7 @@
           <a:p>
             <a:fld id="{62F62857-B228-3A40-90DD-E9A7B26EE83A}" type="datetimeFigureOut">
               <a:rPr kumimoji="1" lang="ko-Kore-KR" altLang="en-US" smtClean="0"/>
-              <a:t>2022. 3. 5.</a:t>
+              <a:t>03/21/2022</a:t>
             </a:fld>
             <a:endParaRPr kumimoji="1" lang="ko-Kore-KR" altLang="en-US"/>
           </a:p>
@@ -675,7 +676,7 @@
           <a:p>
             <a:fld id="{62F62857-B228-3A40-90DD-E9A7B26EE83A}" type="datetimeFigureOut">
               <a:rPr kumimoji="1" lang="ko-Kore-KR" altLang="en-US" smtClean="0"/>
-              <a:t>2022. 3. 5.</a:t>
+              <a:t>03/21/2022</a:t>
             </a:fld>
             <a:endParaRPr kumimoji="1" lang="ko-Kore-KR" altLang="en-US"/>
           </a:p>
@@ -875,7 +876,7 @@
           <a:p>
             <a:fld id="{62F62857-B228-3A40-90DD-E9A7B26EE83A}" type="datetimeFigureOut">
               <a:rPr kumimoji="1" lang="ko-Kore-KR" altLang="en-US" smtClean="0"/>
-              <a:t>2022. 3. 5.</a:t>
+              <a:t>03/21/2022</a:t>
             </a:fld>
             <a:endParaRPr kumimoji="1" lang="ko-Kore-KR" altLang="en-US"/>
           </a:p>
@@ -1151,7 +1152,7 @@
           <a:p>
             <a:fld id="{62F62857-B228-3A40-90DD-E9A7B26EE83A}" type="datetimeFigureOut">
               <a:rPr kumimoji="1" lang="ko-Kore-KR" altLang="en-US" smtClean="0"/>
-              <a:t>2022. 3. 5.</a:t>
+              <a:t>03/21/2022</a:t>
             </a:fld>
             <a:endParaRPr kumimoji="1" lang="ko-Kore-KR" altLang="en-US"/>
           </a:p>
@@ -1419,7 +1420,7 @@
           <a:p>
             <a:fld id="{62F62857-B228-3A40-90DD-E9A7B26EE83A}" type="datetimeFigureOut">
               <a:rPr kumimoji="1" lang="ko-Kore-KR" altLang="en-US" smtClean="0"/>
-              <a:t>2022. 3. 5.</a:t>
+              <a:t>03/21/2022</a:t>
             </a:fld>
             <a:endParaRPr kumimoji="1" lang="ko-Kore-KR" altLang="en-US"/>
           </a:p>
@@ -1834,7 +1835,7 @@
           <a:p>
             <a:fld id="{62F62857-B228-3A40-90DD-E9A7B26EE83A}" type="datetimeFigureOut">
               <a:rPr kumimoji="1" lang="ko-Kore-KR" altLang="en-US" smtClean="0"/>
-              <a:t>2022. 3. 5.</a:t>
+              <a:t>03/21/2022</a:t>
             </a:fld>
             <a:endParaRPr kumimoji="1" lang="ko-Kore-KR" altLang="en-US"/>
           </a:p>
@@ -1976,7 +1977,7 @@
           <a:p>
             <a:fld id="{62F62857-B228-3A40-90DD-E9A7B26EE83A}" type="datetimeFigureOut">
               <a:rPr kumimoji="1" lang="ko-Kore-KR" altLang="en-US" smtClean="0"/>
-              <a:t>2022. 3. 5.</a:t>
+              <a:t>03/21/2022</a:t>
             </a:fld>
             <a:endParaRPr kumimoji="1" lang="ko-Kore-KR" altLang="en-US"/>
           </a:p>
@@ -2089,7 +2090,7 @@
           <a:p>
             <a:fld id="{62F62857-B228-3A40-90DD-E9A7B26EE83A}" type="datetimeFigureOut">
               <a:rPr kumimoji="1" lang="ko-Kore-KR" altLang="en-US" smtClean="0"/>
-              <a:t>2022. 3. 5.</a:t>
+              <a:t>03/21/2022</a:t>
             </a:fld>
             <a:endParaRPr kumimoji="1" lang="ko-Kore-KR" altLang="en-US"/>
           </a:p>
@@ -2402,7 +2403,7 @@
           <a:p>
             <a:fld id="{62F62857-B228-3A40-90DD-E9A7B26EE83A}" type="datetimeFigureOut">
               <a:rPr kumimoji="1" lang="ko-Kore-KR" altLang="en-US" smtClean="0"/>
-              <a:t>2022. 3. 5.</a:t>
+              <a:t>03/21/2022</a:t>
             </a:fld>
             <a:endParaRPr kumimoji="1" lang="ko-Kore-KR" altLang="en-US"/>
           </a:p>
@@ -2691,7 +2692,7 @@
           <a:p>
             <a:fld id="{62F62857-B228-3A40-90DD-E9A7B26EE83A}" type="datetimeFigureOut">
               <a:rPr kumimoji="1" lang="ko-Kore-KR" altLang="en-US" smtClean="0"/>
-              <a:t>2022. 3. 5.</a:t>
+              <a:t>03/21/2022</a:t>
             </a:fld>
             <a:endParaRPr kumimoji="1" lang="ko-Kore-KR" altLang="en-US"/>
           </a:p>
@@ -2934,7 +2935,7 @@
           <a:p>
             <a:fld id="{62F62857-B228-3A40-90DD-E9A7B26EE83A}" type="datetimeFigureOut">
               <a:rPr kumimoji="1" lang="ko-Kore-KR" altLang="en-US" smtClean="0"/>
-              <a:t>2022. 3. 5.</a:t>
+              <a:t>03/21/2022</a:t>
             </a:fld>
             <a:endParaRPr kumimoji="1" lang="ko-Kore-KR" altLang="en-US"/>
           </a:p>
@@ -5991,6 +5992,373 @@
 </p:sld>
 </file>
 
+<file path=ppt/slides/slide6.xml><?xml version="1.0" encoding="utf-8"?>
+<p:sld xmlns:a="http://schemas.openxmlformats.org/drawingml/2006/main" xmlns:r="http://schemas.openxmlformats.org/officeDocument/2006/relationships" xmlns:p="http://schemas.openxmlformats.org/presentationml/2006/main">
+  <p:cSld>
+    <p:spTree>
+      <p:nvGrpSpPr>
+        <p:cNvPr id="1" name=""/>
+        <p:cNvGrpSpPr/>
+        <p:nvPr/>
+      </p:nvGrpSpPr>
+      <p:grpSpPr>
+        <a:xfrm>
+          <a:off x="0" y="0"/>
+          <a:ext cx="0" cy="0"/>
+          <a:chOff x="0" y="0"/>
+          <a:chExt cx="0" cy="0"/>
+        </a:xfrm>
+      </p:grpSpPr>
+      <p:grpSp>
+        <p:nvGrpSpPr>
+          <p:cNvPr id="37" name="그룹 36">
+            <a:extLst>
+              <a:ext uri="{FF2B5EF4-FFF2-40B4-BE49-F238E27FC236}">
+                <a16:creationId xmlns:a16="http://schemas.microsoft.com/office/drawing/2014/main" id="{396BFAA4-1E38-434B-B633-B6A015F9DECD}"/>
+              </a:ext>
+            </a:extLst>
+          </p:cNvPr>
+          <p:cNvGrpSpPr/>
+          <p:nvPr/>
+        </p:nvGrpSpPr>
+        <p:grpSpPr>
+          <a:xfrm>
+            <a:off x="5327308" y="2564205"/>
+            <a:ext cx="2432392" cy="2258644"/>
+            <a:chOff x="5327308" y="2564205"/>
+            <a:chExt cx="2432392" cy="2258644"/>
+          </a:xfrm>
+        </p:grpSpPr>
+        <p:cxnSp>
+          <p:nvCxnSpPr>
+            <p:cNvPr id="8" name="직선 화살표 연결선 7">
+              <a:extLst>
+                <a:ext uri="{FF2B5EF4-FFF2-40B4-BE49-F238E27FC236}">
+                  <a16:creationId xmlns:a16="http://schemas.microsoft.com/office/drawing/2014/main" id="{2F756FEC-11D1-43D1-9F91-C4CD584465FA}"/>
+                </a:ext>
+              </a:extLst>
+            </p:cNvPr>
+            <p:cNvCxnSpPr>
+              <a:cxnSpLocks/>
+            </p:cNvCxnSpPr>
+            <p:nvPr/>
+          </p:nvCxnSpPr>
+          <p:spPr>
+            <a:xfrm rot="1800000">
+              <a:off x="5327308" y="4582034"/>
+              <a:ext cx="1537378" cy="0"/>
+            </a:xfrm>
+            <a:prstGeom prst="straightConnector1">
+              <a:avLst/>
+            </a:prstGeom>
+            <a:ln w="57150">
+              <a:solidFill>
+                <a:schemeClr val="accent6"/>
+              </a:solidFill>
+              <a:tailEnd type="triangle"/>
+            </a:ln>
+          </p:spPr>
+          <p:style>
+            <a:lnRef idx="1">
+              <a:schemeClr val="accent1"/>
+            </a:lnRef>
+            <a:fillRef idx="0">
+              <a:schemeClr val="accent1"/>
+            </a:fillRef>
+            <a:effectRef idx="0">
+              <a:schemeClr val="accent1"/>
+            </a:effectRef>
+            <a:fontRef idx="minor">
+              <a:schemeClr val="tx1"/>
+            </a:fontRef>
+          </p:style>
+        </p:cxnSp>
+        <p:cxnSp>
+          <p:nvCxnSpPr>
+            <p:cNvPr id="14" name="직선 화살표 연결선 13">
+              <a:extLst>
+                <a:ext uri="{FF2B5EF4-FFF2-40B4-BE49-F238E27FC236}">
+                  <a16:creationId xmlns:a16="http://schemas.microsoft.com/office/drawing/2014/main" id="{1BFE078E-C169-4589-AEA1-637263BD4F3A}"/>
+                </a:ext>
+              </a:extLst>
+            </p:cNvPr>
+            <p:cNvCxnSpPr>
+              <a:cxnSpLocks/>
+            </p:cNvCxnSpPr>
+            <p:nvPr/>
+          </p:nvCxnSpPr>
+          <p:spPr>
+            <a:xfrm rot="-5400000">
+              <a:off x="4661603" y="3429000"/>
+              <a:ext cx="1537378" cy="0"/>
+            </a:xfrm>
+            <a:prstGeom prst="straightConnector1">
+              <a:avLst/>
+            </a:prstGeom>
+            <a:ln w="57150">
+              <a:solidFill>
+                <a:schemeClr val="accent5"/>
+              </a:solidFill>
+              <a:tailEnd type="triangle"/>
+            </a:ln>
+          </p:spPr>
+          <p:style>
+            <a:lnRef idx="1">
+              <a:schemeClr val="accent1"/>
+            </a:lnRef>
+            <a:fillRef idx="0">
+              <a:schemeClr val="accent1"/>
+            </a:fillRef>
+            <a:effectRef idx="0">
+              <a:schemeClr val="accent1"/>
+            </a:effectRef>
+            <a:fontRef idx="minor">
+              <a:schemeClr val="tx1"/>
+            </a:fontRef>
+          </p:style>
+        </p:cxnSp>
+        <p:cxnSp>
+          <p:nvCxnSpPr>
+            <p:cNvPr id="15" name="직선 화살표 연결선 14">
+              <a:extLst>
+                <a:ext uri="{FF2B5EF4-FFF2-40B4-BE49-F238E27FC236}">
+                  <a16:creationId xmlns:a16="http://schemas.microsoft.com/office/drawing/2014/main" id="{129EC361-4AFE-4461-93DA-2F2062E64C2E}"/>
+                </a:ext>
+              </a:extLst>
+            </p:cNvPr>
+            <p:cNvCxnSpPr>
+              <a:cxnSpLocks/>
+            </p:cNvCxnSpPr>
+            <p:nvPr/>
+          </p:nvCxnSpPr>
+          <p:spPr>
+            <a:xfrm rot="-1800000">
+              <a:off x="5327309" y="3813345"/>
+              <a:ext cx="1537378" cy="0"/>
+            </a:xfrm>
+            <a:prstGeom prst="straightConnector1">
+              <a:avLst/>
+            </a:prstGeom>
+            <a:ln w="57150">
+              <a:solidFill>
+                <a:srgbClr val="C00000"/>
+              </a:solidFill>
+              <a:tailEnd type="triangle"/>
+            </a:ln>
+          </p:spPr>
+          <p:style>
+            <a:lnRef idx="1">
+              <a:schemeClr val="accent1"/>
+            </a:lnRef>
+            <a:fillRef idx="0">
+              <a:schemeClr val="accent1"/>
+            </a:fillRef>
+            <a:effectRef idx="0">
+              <a:schemeClr val="accent1"/>
+            </a:effectRef>
+            <a:fontRef idx="minor">
+              <a:schemeClr val="tx1"/>
+            </a:fontRef>
+          </p:style>
+        </p:cxnSp>
+        <p:sp>
+          <p:nvSpPr>
+            <p:cNvPr id="33" name="타원 32">
+              <a:extLst>
+                <a:ext uri="{FF2B5EF4-FFF2-40B4-BE49-F238E27FC236}">
+                  <a16:creationId xmlns:a16="http://schemas.microsoft.com/office/drawing/2014/main" id="{BFB7EEBD-0D62-4632-85DF-C2583766CF5A}"/>
+                </a:ext>
+              </a:extLst>
+            </p:cNvPr>
+            <p:cNvSpPr/>
+            <p:nvPr/>
+          </p:nvSpPr>
+          <p:spPr>
+            <a:xfrm>
+              <a:off x="5340350" y="4095750"/>
+              <a:ext cx="190500" cy="190500"/>
+            </a:xfrm>
+            <a:prstGeom prst="ellipse">
+              <a:avLst/>
+            </a:prstGeom>
+            <a:solidFill>
+              <a:schemeClr val="bg1"/>
+            </a:solidFill>
+            <a:ln>
+              <a:noFill/>
+            </a:ln>
+          </p:spPr>
+          <p:style>
+            <a:lnRef idx="2">
+              <a:schemeClr val="accent1">
+                <a:shade val="50000"/>
+              </a:schemeClr>
+            </a:lnRef>
+            <a:fillRef idx="1">
+              <a:schemeClr val="accent1"/>
+            </a:fillRef>
+            <a:effectRef idx="0">
+              <a:schemeClr val="accent1"/>
+            </a:effectRef>
+            <a:fontRef idx="minor">
+              <a:schemeClr val="lt1"/>
+            </a:fontRef>
+          </p:style>
+          <p:txBody>
+            <a:bodyPr rtlCol="0" anchor="ctr"/>
+            <a:lstStyle/>
+            <a:p>
+              <a:pPr algn="ctr"/>
+              <a:endParaRPr lang="ko-KR" altLang="en-US"/>
+            </a:p>
+          </p:txBody>
+        </p:sp>
+        <p:sp>
+          <p:nvSpPr>
+            <p:cNvPr id="34" name="TextBox 33">
+              <a:extLst>
+                <a:ext uri="{FF2B5EF4-FFF2-40B4-BE49-F238E27FC236}">
+                  <a16:creationId xmlns:a16="http://schemas.microsoft.com/office/drawing/2014/main" id="{E1FA92AA-ADF8-409E-BA5A-0869BE7291FA}"/>
+                </a:ext>
+              </a:extLst>
+            </p:cNvPr>
+            <p:cNvSpPr txBox="1"/>
+            <p:nvPr/>
+          </p:nvSpPr>
+          <p:spPr>
+            <a:xfrm>
+              <a:off x="6711948" y="3444013"/>
+              <a:ext cx="1003301" cy="338554"/>
+            </a:xfrm>
+            <a:prstGeom prst="rect">
+              <a:avLst/>
+            </a:prstGeom>
+            <a:noFill/>
+          </p:spPr>
+          <p:txBody>
+            <a:bodyPr wrap="square" rtlCol="0">
+              <a:spAutoFit/>
+            </a:bodyPr>
+            <a:lstStyle/>
+            <a:p>
+              <a:r>
+                <a:rPr lang="en-US" altLang="ko-KR" sz="1600">
+                  <a:solidFill>
+                    <a:srgbClr val="C00000"/>
+                  </a:solidFill>
+                </a:rPr>
+                <a:t>X - Roll </a:t>
+              </a:r>
+              <a:endParaRPr lang="ko-KR" altLang="en-US" sz="1600">
+                <a:solidFill>
+                  <a:srgbClr val="C00000"/>
+                </a:solidFill>
+              </a:endParaRPr>
+            </a:p>
+          </p:txBody>
+        </p:sp>
+        <p:sp>
+          <p:nvSpPr>
+            <p:cNvPr id="35" name="TextBox 34">
+              <a:extLst>
+                <a:ext uri="{FF2B5EF4-FFF2-40B4-BE49-F238E27FC236}">
+                  <a16:creationId xmlns:a16="http://schemas.microsoft.com/office/drawing/2014/main" id="{B5C039DE-B328-480F-8971-96CB07C36935}"/>
+                </a:ext>
+              </a:extLst>
+            </p:cNvPr>
+            <p:cNvSpPr txBox="1"/>
+            <p:nvPr/>
+          </p:nvSpPr>
+          <p:spPr>
+            <a:xfrm>
+              <a:off x="5530849" y="2564205"/>
+              <a:ext cx="1015997" cy="338554"/>
+            </a:xfrm>
+            <a:prstGeom prst="rect">
+              <a:avLst/>
+            </a:prstGeom>
+            <a:noFill/>
+          </p:spPr>
+          <p:txBody>
+            <a:bodyPr wrap="square" rtlCol="0">
+              <a:spAutoFit/>
+            </a:bodyPr>
+            <a:lstStyle/>
+            <a:p>
+              <a:r>
+                <a:rPr lang="en-US" altLang="ko-KR" sz="1600">
+                  <a:solidFill>
+                    <a:schemeClr val="accent5"/>
+                  </a:solidFill>
+                </a:rPr>
+                <a:t>Z - Yaw</a:t>
+              </a:r>
+              <a:endParaRPr lang="ko-KR" altLang="en-US" sz="1600">
+                <a:solidFill>
+                  <a:schemeClr val="accent5"/>
+                </a:solidFill>
+              </a:endParaRPr>
+            </a:p>
+          </p:txBody>
+        </p:sp>
+        <p:sp>
+          <p:nvSpPr>
+            <p:cNvPr id="36" name="TextBox 35">
+              <a:extLst>
+                <a:ext uri="{FF2B5EF4-FFF2-40B4-BE49-F238E27FC236}">
+                  <a16:creationId xmlns:a16="http://schemas.microsoft.com/office/drawing/2014/main" id="{13CF3748-F8C1-4981-A0DA-7BEBDD623DE2}"/>
+                </a:ext>
+              </a:extLst>
+            </p:cNvPr>
+            <p:cNvSpPr txBox="1"/>
+            <p:nvPr/>
+          </p:nvSpPr>
+          <p:spPr>
+            <a:xfrm>
+              <a:off x="6639445" y="4484295"/>
+              <a:ext cx="1120255" cy="338554"/>
+            </a:xfrm>
+            <a:prstGeom prst="rect">
+              <a:avLst/>
+            </a:prstGeom>
+            <a:noFill/>
+          </p:spPr>
+          <p:txBody>
+            <a:bodyPr wrap="square" rtlCol="0">
+              <a:spAutoFit/>
+            </a:bodyPr>
+            <a:lstStyle/>
+            <a:p>
+              <a:r>
+                <a:rPr lang="en-US" altLang="ko-KR" sz="1600">
+                  <a:solidFill>
+                    <a:schemeClr val="accent6"/>
+                  </a:solidFill>
+                </a:rPr>
+                <a:t>Y - Pitch</a:t>
+              </a:r>
+              <a:endParaRPr lang="ko-KR" altLang="en-US" sz="1600">
+                <a:solidFill>
+                  <a:schemeClr val="accent6"/>
+                </a:solidFill>
+              </a:endParaRPr>
+            </a:p>
+          </p:txBody>
+        </p:sp>
+      </p:grpSp>
+    </p:spTree>
+    <p:extLst>
+      <p:ext uri="{BB962C8B-B14F-4D97-AF65-F5344CB8AC3E}">
+        <p14:creationId xmlns:p14="http://schemas.microsoft.com/office/powerpoint/2010/main" val="3276669503"/>
+      </p:ext>
+    </p:extLst>
+  </p:cSld>
+  <p:clrMapOvr>
+    <a:masterClrMapping/>
+  </p:clrMapOvr>
+</p:sld>
+</file>
+
 <file path=ppt/theme/theme1.xml><?xml version="1.0" encoding="utf-8"?>
 <a:theme xmlns:a="http://schemas.openxmlformats.org/drawingml/2006/main" name="Office 테마">
   <a:themeElements>

</xml_diff>